<commit_message>
Update week 6 demo
</commit_message>
<xml_diff>
--- a/week-06/day-5/w6demo.pptx
+++ b/week-06/day-5/w6demo.pptx
@@ -217,7 +217,7 @@
           <a:p>
             <a:fld id="{A78B9592-C31E-48A1-9533-B22525C0F34B}" type="datetimeFigureOut">
               <a:rPr lang="hu-HU" smtClean="0"/>
-              <a:t>2017.11.17.</a:t>
+              <a:t>2018.01.04.</a:t>
             </a:fld>
             <a:endParaRPr lang="hu-HU"/>
           </a:p>
@@ -667,7 +667,7 @@
             <a:fld id="{460F9662-45DB-4F6A-AF5D-1780AE16667B}" type="datetimeFigureOut">
               <a:rPr lang="hu-HU" smtClean="0"/>
               <a:pPr/>
-              <a:t>2017.11.17.</a:t>
+              <a:t>2018.01.04.</a:t>
             </a:fld>
             <a:endParaRPr lang="hu-HU"/>
           </a:p>
@@ -834,7 +834,7 @@
             <a:fld id="{460F9662-45DB-4F6A-AF5D-1780AE16667B}" type="datetimeFigureOut">
               <a:rPr lang="hu-HU" smtClean="0"/>
               <a:pPr/>
-              <a:t>2017.11.17.</a:t>
+              <a:t>2018.01.04.</a:t>
             </a:fld>
             <a:endParaRPr lang="hu-HU"/>
           </a:p>
@@ -1011,7 +1011,7 @@
             <a:fld id="{460F9662-45DB-4F6A-AF5D-1780AE16667B}" type="datetimeFigureOut">
               <a:rPr lang="hu-HU" smtClean="0"/>
               <a:pPr/>
-              <a:t>2017.11.17.</a:t>
+              <a:t>2018.01.04.</a:t>
             </a:fld>
             <a:endParaRPr lang="hu-HU"/>
           </a:p>
@@ -1178,7 +1178,7 @@
             <a:fld id="{460F9662-45DB-4F6A-AF5D-1780AE16667B}" type="datetimeFigureOut">
               <a:rPr lang="hu-HU" smtClean="0"/>
               <a:pPr/>
-              <a:t>2017.11.17.</a:t>
+              <a:t>2018.01.04.</a:t>
             </a:fld>
             <a:endParaRPr lang="hu-HU"/>
           </a:p>
@@ -1421,7 +1421,7 @@
             <a:fld id="{460F9662-45DB-4F6A-AF5D-1780AE16667B}" type="datetimeFigureOut">
               <a:rPr lang="hu-HU" smtClean="0"/>
               <a:pPr/>
-              <a:t>2017.11.17.</a:t>
+              <a:t>2018.01.04.</a:t>
             </a:fld>
             <a:endParaRPr lang="hu-HU"/>
           </a:p>
@@ -1706,7 +1706,7 @@
             <a:fld id="{460F9662-45DB-4F6A-AF5D-1780AE16667B}" type="datetimeFigureOut">
               <a:rPr lang="hu-HU" smtClean="0"/>
               <a:pPr/>
-              <a:t>2017.11.17.</a:t>
+              <a:t>2018.01.04.</a:t>
             </a:fld>
             <a:endParaRPr lang="hu-HU"/>
           </a:p>
@@ -2125,7 +2125,7 @@
             <a:fld id="{460F9662-45DB-4F6A-AF5D-1780AE16667B}" type="datetimeFigureOut">
               <a:rPr lang="hu-HU" smtClean="0"/>
               <a:pPr/>
-              <a:t>2017.11.17.</a:t>
+              <a:t>2018.01.04.</a:t>
             </a:fld>
             <a:endParaRPr lang="hu-HU"/>
           </a:p>
@@ -2240,7 +2240,7 @@
             <a:fld id="{460F9662-45DB-4F6A-AF5D-1780AE16667B}" type="datetimeFigureOut">
               <a:rPr lang="hu-HU" smtClean="0"/>
               <a:pPr/>
-              <a:t>2017.11.17.</a:t>
+              <a:t>2018.01.04.</a:t>
             </a:fld>
             <a:endParaRPr lang="hu-HU"/>
           </a:p>
@@ -2332,7 +2332,7 @@
             <a:fld id="{460F9662-45DB-4F6A-AF5D-1780AE16667B}" type="datetimeFigureOut">
               <a:rPr lang="hu-HU" smtClean="0"/>
               <a:pPr/>
-              <a:t>2017.11.17.</a:t>
+              <a:t>2018.01.04.</a:t>
             </a:fld>
             <a:endParaRPr lang="hu-HU"/>
           </a:p>
@@ -2606,7 +2606,7 @@
             <a:fld id="{460F9662-45DB-4F6A-AF5D-1780AE16667B}" type="datetimeFigureOut">
               <a:rPr lang="hu-HU" smtClean="0"/>
               <a:pPr/>
-              <a:t>2017.11.17.</a:t>
+              <a:t>2018.01.04.</a:t>
             </a:fld>
             <a:endParaRPr lang="hu-HU"/>
           </a:p>
@@ -2856,7 +2856,7 @@
             <a:fld id="{460F9662-45DB-4F6A-AF5D-1780AE16667B}" type="datetimeFigureOut">
               <a:rPr lang="hu-HU" smtClean="0"/>
               <a:pPr/>
-              <a:t>2017.11.17.</a:t>
+              <a:t>2018.01.04.</a:t>
             </a:fld>
             <a:endParaRPr lang="hu-HU"/>
           </a:p>
@@ -3066,7 +3066,7 @@
             <a:fld id="{460F9662-45DB-4F6A-AF5D-1780AE16667B}" type="datetimeFigureOut">
               <a:rPr lang="hu-HU" smtClean="0"/>
               <a:pPr/>
-              <a:t>2017.11.17.</a:t>
+              <a:t>2018.01.04.</a:t>
             </a:fld>
             <a:endParaRPr lang="hu-HU"/>
           </a:p>
@@ -3976,45 +3976,6 @@
           </a:prstGeom>
         </p:spPr>
       </p:pic>
-      <p:pic>
-        <p:nvPicPr>
-          <p:cNvPr id="4" name="Kép 3"/>
-          <p:cNvPicPr>
-            <a:picLocks noChangeAspect="1"/>
-          </p:cNvPicPr>
-          <p:nvPr/>
-        </p:nvPicPr>
-        <p:blipFill>
-          <a:blip r:embed="rId3" cstate="print">
-            <a:extLst>
-              <a:ext uri="{BEBA8EAE-BF5A-486C-A8C5-ECC9F3942E4B}">
-                <a14:imgProps xmlns:a14="http://schemas.microsoft.com/office/drawing/2010/main">
-                  <a14:imgLayer r:embed="rId4">
-                    <a14:imgEffect>
-                      <a14:backgroundRemoval t="1521" b="100000" l="0" r="99320"/>
-                    </a14:imgEffect>
-                  </a14:imgLayer>
-                </a14:imgProps>
-              </a:ext>
-              <a:ext uri="{28A0092B-C50C-407E-A947-70E740481C1C}">
-                <a14:useLocalDpi xmlns:a14="http://schemas.microsoft.com/office/drawing/2010/main" val="0"/>
-              </a:ext>
-            </a:extLst>
-          </a:blip>
-          <a:stretch>
-            <a:fillRect/>
-          </a:stretch>
-        </p:blipFill>
-        <p:spPr>
-          <a:xfrm rot="21099704">
-            <a:off x="3620568" y="2551660"/>
-            <a:ext cx="847264" cy="505284"/>
-          </a:xfrm>
-          <a:prstGeom prst="rect">
-            <a:avLst/>
-          </a:prstGeom>
-        </p:spPr>
-      </p:pic>
     </p:spTree>
     <p:extLst>
       <p:ext uri="{BB962C8B-B14F-4D97-AF65-F5344CB8AC3E}">
@@ -4028,75 +3989,7 @@
   <p:timing>
     <p:tnLst>
       <p:par>
-        <p:cTn id="1" dur="indefinite" restart="never" nodeType="tmRoot">
-          <p:childTnLst>
-            <p:seq concurrent="1" nextAc="seek">
-              <p:cTn id="2" dur="indefinite" nodeType="mainSeq">
-                <p:childTnLst>
-                  <p:par>
-                    <p:cTn id="3" fill="hold">
-                      <p:stCondLst>
-                        <p:cond delay="indefinite"/>
-                      </p:stCondLst>
-                      <p:childTnLst>
-                        <p:par>
-                          <p:cTn id="4" fill="hold">
-                            <p:stCondLst>
-                              <p:cond delay="0"/>
-                            </p:stCondLst>
-                            <p:childTnLst>
-                              <p:par>
-                                <p:cTn id="5" presetID="1" presetClass="entr" presetSubtype="0" fill="hold" nodeType="clickEffect">
-                                  <p:stCondLst>
-                                    <p:cond delay="0"/>
-                                  </p:stCondLst>
-                                  <p:childTnLst>
-                                    <p:set>
-                                      <p:cBhvr>
-                                        <p:cTn id="6" dur="1" fill="hold">
-                                          <p:stCondLst>
-                                            <p:cond delay="0"/>
-                                          </p:stCondLst>
-                                        </p:cTn>
-                                        <p:tgtEl>
-                                          <p:spTgt spid="4"/>
-                                        </p:tgtEl>
-                                        <p:attrNameLst>
-                                          <p:attrName>style.visibility</p:attrName>
-                                        </p:attrNameLst>
-                                      </p:cBhvr>
-                                      <p:to>
-                                        <p:strVal val="visible"/>
-                                      </p:to>
-                                    </p:set>
-                                  </p:childTnLst>
-                                </p:cTn>
-                              </p:par>
-                            </p:childTnLst>
-                          </p:cTn>
-                        </p:par>
-                      </p:childTnLst>
-                    </p:cTn>
-                  </p:par>
-                </p:childTnLst>
-              </p:cTn>
-              <p:prevCondLst>
-                <p:cond evt="onPrev" delay="0">
-                  <p:tgtEl>
-                    <p:sldTgt/>
-                  </p:tgtEl>
-                </p:cond>
-              </p:prevCondLst>
-              <p:nextCondLst>
-                <p:cond evt="onNext" delay="0">
-                  <p:tgtEl>
-                    <p:sldTgt/>
-                  </p:tgtEl>
-                </p:cond>
-              </p:nextCondLst>
-            </p:seq>
-          </p:childTnLst>
-        </p:cTn>
+        <p:cTn id="1" dur="indefinite" restart="never" nodeType="tmRoot"/>
       </p:par>
     </p:tnLst>
   </p:timing>

</xml_diff>